<commit_message>
Added components (multi position switch and USB port). Modified funcional diagram
</commit_message>
<xml_diff>
--- a/project_02/FranckMontano_ENGI301_project_2_proposal.pptx
+++ b/project_02/FranckMontano_ENGI301_project_2_proposal.pptx
@@ -15254,6 +15254,20 @@
               <a:t>Buzzer to add sound cues</a:t>
             </a:r>
           </a:p>
+          <a:p>
+            <a:pPr lvl="1"/>
+            <a:r>
+              <a:rPr lang="en-US" dirty="0"/>
+              <a:t>Multi-position switch to select games</a:t>
+            </a:r>
+          </a:p>
+          <a:p>
+            <a:pPr lvl="1"/>
+            <a:r>
+              <a:rPr lang="en-US" dirty="0"/>
+              <a:t>USB connection for power and code modification</a:t>
+            </a:r>
+          </a:p>
         </p:txBody>
       </p:sp>
     </p:spTree>
@@ -15425,7 +15439,7 @@
             <a:pPr algn="ctr"/>
             <a:r>
               <a:rPr lang="en-US" sz="1050" dirty="0"/>
-              <a:t>Button</a:t>
+              <a:t>Light-Up Button</a:t>
             </a:r>
           </a:p>
         </p:txBody>
@@ -15474,7 +15488,7 @@
             <a:pPr algn="ctr"/>
             <a:r>
               <a:rPr lang="en-US" sz="1050" dirty="0"/>
-              <a:t>LED</a:t>
+              <a:t>Multi-Position Switch</a:t>
             </a:r>
           </a:p>
         </p:txBody>
@@ -15680,136 +15694,7 @@
         </p:nvCxnSpPr>
         <p:spPr>
           <a:xfrm>
-            <a:off x="2211650" y="3967906"/>
-            <a:ext cx="1383670" cy="1"/>
-          </a:xfrm>
-          <a:prstGeom prst="line">
-            <a:avLst/>
-          </a:prstGeom>
-          <a:ln w="12700">
-            <a:solidFill>
-              <a:schemeClr val="tx1"/>
-            </a:solidFill>
-          </a:ln>
-        </p:spPr>
-        <p:style>
-          <a:lnRef idx="1">
-            <a:schemeClr val="accent1"/>
-          </a:lnRef>
-          <a:fillRef idx="0">
-            <a:schemeClr val="accent1"/>
-          </a:fillRef>
-          <a:effectRef idx="0">
-            <a:schemeClr val="accent1"/>
-          </a:effectRef>
-          <a:fontRef idx="minor">
-            <a:schemeClr val="tx1"/>
-          </a:fontRef>
-        </p:style>
-      </p:cxnSp>
-      <p:cxnSp>
-        <p:nvCxnSpPr>
-          <p:cNvPr id="71" name="Straight Connector 70">
-            <a:extLst>
-              <a:ext uri="{FF2B5EF4-FFF2-40B4-BE49-F238E27FC236}">
-                <a16:creationId xmlns:a16="http://schemas.microsoft.com/office/drawing/2014/main" id="{EB293601-2569-44B1-81D2-901C19850383}"/>
-              </a:ext>
-            </a:extLst>
-          </p:cNvPr>
-          <p:cNvCxnSpPr>
-            <a:cxnSpLocks/>
-          </p:cNvCxnSpPr>
-          <p:nvPr/>
-        </p:nvCxnSpPr>
-        <p:spPr>
-          <a:xfrm>
-            <a:off x="2211650" y="4050375"/>
-            <a:ext cx="1383670" cy="1"/>
-          </a:xfrm>
-          <a:prstGeom prst="line">
-            <a:avLst/>
-          </a:prstGeom>
-          <a:ln w="12700">
-            <a:solidFill>
-              <a:schemeClr val="tx1"/>
-            </a:solidFill>
-          </a:ln>
-        </p:spPr>
-        <p:style>
-          <a:lnRef idx="1">
-            <a:schemeClr val="accent1"/>
-          </a:lnRef>
-          <a:fillRef idx="0">
-            <a:schemeClr val="accent1"/>
-          </a:fillRef>
-          <a:effectRef idx="0">
-            <a:schemeClr val="accent1"/>
-          </a:effectRef>
-          <a:fontRef idx="minor">
-            <a:schemeClr val="tx1"/>
-          </a:fontRef>
-        </p:style>
-      </p:cxnSp>
-      <p:cxnSp>
-        <p:nvCxnSpPr>
-          <p:cNvPr id="74" name="Straight Connector 73">
-            <a:extLst>
-              <a:ext uri="{FF2B5EF4-FFF2-40B4-BE49-F238E27FC236}">
-                <a16:creationId xmlns:a16="http://schemas.microsoft.com/office/drawing/2014/main" id="{601DA553-6139-4B59-8348-646C5DD14A4B}"/>
-              </a:ext>
-            </a:extLst>
-          </p:cNvPr>
-          <p:cNvCxnSpPr>
-            <a:cxnSpLocks/>
-          </p:cNvCxnSpPr>
-          <p:nvPr/>
-        </p:nvCxnSpPr>
-        <p:spPr>
-          <a:xfrm>
-            <a:off x="2211650" y="4132844"/>
-            <a:ext cx="1383670" cy="1"/>
-          </a:xfrm>
-          <a:prstGeom prst="line">
-            <a:avLst/>
-          </a:prstGeom>
-          <a:ln w="12700">
-            <a:solidFill>
-              <a:schemeClr val="tx1"/>
-            </a:solidFill>
-          </a:ln>
-        </p:spPr>
-        <p:style>
-          <a:lnRef idx="1">
-            <a:schemeClr val="accent1"/>
-          </a:lnRef>
-          <a:fillRef idx="0">
-            <a:schemeClr val="accent1"/>
-          </a:fillRef>
-          <a:effectRef idx="0">
-            <a:schemeClr val="accent1"/>
-          </a:effectRef>
-          <a:fontRef idx="minor">
-            <a:schemeClr val="tx1"/>
-          </a:fontRef>
-        </p:style>
-      </p:cxnSp>
-      <p:cxnSp>
-        <p:nvCxnSpPr>
-          <p:cNvPr id="76" name="Straight Connector 75">
-            <a:extLst>
-              <a:ext uri="{FF2B5EF4-FFF2-40B4-BE49-F238E27FC236}">
-                <a16:creationId xmlns:a16="http://schemas.microsoft.com/office/drawing/2014/main" id="{68B442A0-3785-4FB2-AAE3-76B64D2D14D6}"/>
-              </a:ext>
-            </a:extLst>
-          </p:cNvPr>
-          <p:cNvCxnSpPr>
-            <a:cxnSpLocks/>
-          </p:cNvCxnSpPr>
-          <p:nvPr/>
-        </p:nvCxnSpPr>
-        <p:spPr>
-          <a:xfrm>
-            <a:off x="2208995" y="4211310"/>
+            <a:off x="2215718" y="4101473"/>
             <a:ext cx="1383670" cy="1"/>
           </a:xfrm>
           <a:prstGeom prst="line">
@@ -16092,7 +15977,7 @@
         </p:nvSpPr>
         <p:spPr>
           <a:xfrm>
-            <a:off x="2507661" y="3649451"/>
+            <a:off x="2525293" y="3795679"/>
             <a:ext cx="762982" cy="369332"/>
           </a:xfrm>
           <a:prstGeom prst="rect">
@@ -16321,7 +16206,7 @@
             <a:pPr algn="ctr"/>
             <a:r>
               <a:rPr lang="en-US" sz="1050" dirty="0"/>
-              <a:t>Button</a:t>
+              <a:t>Light-Up Button</a:t>
             </a:r>
           </a:p>
         </p:txBody>
@@ -16456,7 +16341,7 @@
             <a:pPr algn="ctr"/>
             <a:r>
               <a:rPr lang="en-US" sz="1050" dirty="0"/>
-              <a:t>Button</a:t>
+              <a:t>Light-Up Button</a:t>
             </a:r>
           </a:p>
         </p:txBody>
@@ -16548,416 +16433,11 @@
             <a:pPr algn="ctr"/>
             <a:r>
               <a:rPr lang="en-US" sz="1050" dirty="0"/>
-              <a:t>Button</a:t>
+              <a:t>Light-Up Button</a:t>
             </a:r>
           </a:p>
         </p:txBody>
       </p:sp>
-      <p:sp>
-        <p:nvSpPr>
-          <p:cNvPr id="96" name="Rectangle 95">
-            <a:extLst>
-              <a:ext uri="{FF2B5EF4-FFF2-40B4-BE49-F238E27FC236}">
-                <a16:creationId xmlns:a16="http://schemas.microsoft.com/office/drawing/2014/main" id="{A701079F-1038-4120-AC4A-A3BA1B5EE20E}"/>
-              </a:ext>
-            </a:extLst>
-          </p:cNvPr>
-          <p:cNvSpPr/>
-          <p:nvPr/>
-        </p:nvSpPr>
-        <p:spPr>
-          <a:xfrm>
-            <a:off x="6012309" y="3878683"/>
-            <a:ext cx="1045352" cy="446678"/>
-          </a:xfrm>
-          <a:prstGeom prst="rect">
-            <a:avLst/>
-          </a:prstGeom>
-        </p:spPr>
-        <p:style>
-          <a:lnRef idx="2">
-            <a:schemeClr val="accent1">
-              <a:shade val="50000"/>
-            </a:schemeClr>
-          </a:lnRef>
-          <a:fillRef idx="1">
-            <a:schemeClr val="accent1"/>
-          </a:fillRef>
-          <a:effectRef idx="0">
-            <a:schemeClr val="accent1"/>
-          </a:effectRef>
-          <a:fontRef idx="minor">
-            <a:schemeClr val="lt1"/>
-          </a:fontRef>
-        </p:style>
-        <p:txBody>
-          <a:bodyPr rtlCol="0" anchor="ctr"/>
-          <a:lstStyle/>
-          <a:p>
-            <a:pPr algn="ctr"/>
-            <a:r>
-              <a:rPr lang="en-US" sz="1050" dirty="0"/>
-              <a:t>LED</a:t>
-            </a:r>
-          </a:p>
-        </p:txBody>
-      </p:sp>
-      <p:sp>
-        <p:nvSpPr>
-          <p:cNvPr id="97" name="Rectangle 96">
-            <a:extLst>
-              <a:ext uri="{FF2B5EF4-FFF2-40B4-BE49-F238E27FC236}">
-                <a16:creationId xmlns:a16="http://schemas.microsoft.com/office/drawing/2014/main" id="{4F3196B6-3445-42EF-A90C-6C9FB883FD7A}"/>
-              </a:ext>
-            </a:extLst>
-          </p:cNvPr>
-          <p:cNvSpPr/>
-          <p:nvPr/>
-        </p:nvSpPr>
-        <p:spPr>
-          <a:xfrm>
-            <a:off x="8447386" y="3909505"/>
-            <a:ext cx="1045352" cy="446678"/>
-          </a:xfrm>
-          <a:prstGeom prst="rect">
-            <a:avLst/>
-          </a:prstGeom>
-        </p:spPr>
-        <p:style>
-          <a:lnRef idx="2">
-            <a:schemeClr val="accent1">
-              <a:shade val="50000"/>
-            </a:schemeClr>
-          </a:lnRef>
-          <a:fillRef idx="1">
-            <a:schemeClr val="accent1"/>
-          </a:fillRef>
-          <a:effectRef idx="0">
-            <a:schemeClr val="accent1"/>
-          </a:effectRef>
-          <a:fontRef idx="minor">
-            <a:schemeClr val="lt1"/>
-          </a:fontRef>
-        </p:style>
-        <p:txBody>
-          <a:bodyPr rtlCol="0" anchor="ctr"/>
-          <a:lstStyle/>
-          <a:p>
-            <a:pPr algn="ctr"/>
-            <a:r>
-              <a:rPr lang="en-US" sz="1050" dirty="0"/>
-              <a:t>LED</a:t>
-            </a:r>
-          </a:p>
-        </p:txBody>
-      </p:sp>
-      <p:sp>
-        <p:nvSpPr>
-          <p:cNvPr id="99" name="Rectangle 98">
-            <a:extLst>
-              <a:ext uri="{FF2B5EF4-FFF2-40B4-BE49-F238E27FC236}">
-                <a16:creationId xmlns:a16="http://schemas.microsoft.com/office/drawing/2014/main" id="{FA850FE4-746A-4A37-B1DF-21C95A760066}"/>
-              </a:ext>
-            </a:extLst>
-          </p:cNvPr>
-          <p:cNvSpPr/>
-          <p:nvPr/>
-        </p:nvSpPr>
-        <p:spPr>
-          <a:xfrm>
-            <a:off x="10855402" y="3909505"/>
-            <a:ext cx="1045352" cy="446678"/>
-          </a:xfrm>
-          <a:prstGeom prst="rect">
-            <a:avLst/>
-          </a:prstGeom>
-        </p:spPr>
-        <p:style>
-          <a:lnRef idx="2">
-            <a:schemeClr val="accent1">
-              <a:shade val="50000"/>
-            </a:schemeClr>
-          </a:lnRef>
-          <a:fillRef idx="1">
-            <a:schemeClr val="accent1"/>
-          </a:fillRef>
-          <a:effectRef idx="0">
-            <a:schemeClr val="accent1"/>
-          </a:effectRef>
-          <a:fontRef idx="minor">
-            <a:schemeClr val="lt1"/>
-          </a:fontRef>
-        </p:style>
-        <p:txBody>
-          <a:bodyPr rtlCol="0" anchor="ctr"/>
-          <a:lstStyle/>
-          <a:p>
-            <a:pPr algn="ctr"/>
-            <a:r>
-              <a:rPr lang="en-US" sz="1050" dirty="0"/>
-              <a:t>LED</a:t>
-            </a:r>
-          </a:p>
-        </p:txBody>
-      </p:sp>
-      <p:cxnSp>
-        <p:nvCxnSpPr>
-          <p:cNvPr id="100" name="Straight Connector 99">
-            <a:extLst>
-              <a:ext uri="{FF2B5EF4-FFF2-40B4-BE49-F238E27FC236}">
-                <a16:creationId xmlns:a16="http://schemas.microsoft.com/office/drawing/2014/main" id="{FD4AD992-EC49-4137-931C-22EF408F3FAD}"/>
-              </a:ext>
-            </a:extLst>
-          </p:cNvPr>
-          <p:cNvCxnSpPr>
-            <a:cxnSpLocks/>
-          </p:cNvCxnSpPr>
-          <p:nvPr/>
-        </p:nvCxnSpPr>
-        <p:spPr>
-          <a:xfrm>
-            <a:off x="4627254" y="3968294"/>
-            <a:ext cx="1383670" cy="1"/>
-          </a:xfrm>
-          <a:prstGeom prst="line">
-            <a:avLst/>
-          </a:prstGeom>
-          <a:ln w="12700">
-            <a:solidFill>
-              <a:schemeClr val="tx1"/>
-            </a:solidFill>
-          </a:ln>
-        </p:spPr>
-        <p:style>
-          <a:lnRef idx="1">
-            <a:schemeClr val="accent1"/>
-          </a:lnRef>
-          <a:fillRef idx="0">
-            <a:schemeClr val="accent1"/>
-          </a:fillRef>
-          <a:effectRef idx="0">
-            <a:schemeClr val="accent1"/>
-          </a:effectRef>
-          <a:fontRef idx="minor">
-            <a:schemeClr val="tx1"/>
-          </a:fontRef>
-        </p:style>
-      </p:cxnSp>
-      <p:cxnSp>
-        <p:nvCxnSpPr>
-          <p:cNvPr id="101" name="Straight Connector 100">
-            <a:extLst>
-              <a:ext uri="{FF2B5EF4-FFF2-40B4-BE49-F238E27FC236}">
-                <a16:creationId xmlns:a16="http://schemas.microsoft.com/office/drawing/2014/main" id="{55FEF45E-38F1-44D0-9501-53469E417CDD}"/>
-              </a:ext>
-            </a:extLst>
-          </p:cNvPr>
-          <p:cNvCxnSpPr>
-            <a:cxnSpLocks/>
-          </p:cNvCxnSpPr>
-          <p:nvPr/>
-        </p:nvCxnSpPr>
-        <p:spPr>
-          <a:xfrm>
-            <a:off x="4627254" y="4050763"/>
-            <a:ext cx="1383670" cy="1"/>
-          </a:xfrm>
-          <a:prstGeom prst="line">
-            <a:avLst/>
-          </a:prstGeom>
-          <a:ln w="12700">
-            <a:solidFill>
-              <a:schemeClr val="tx1"/>
-            </a:solidFill>
-          </a:ln>
-        </p:spPr>
-        <p:style>
-          <a:lnRef idx="1">
-            <a:schemeClr val="accent1"/>
-          </a:lnRef>
-          <a:fillRef idx="0">
-            <a:schemeClr val="accent1"/>
-          </a:fillRef>
-          <a:effectRef idx="0">
-            <a:schemeClr val="accent1"/>
-          </a:effectRef>
-          <a:fontRef idx="minor">
-            <a:schemeClr val="tx1"/>
-          </a:fontRef>
-        </p:style>
-      </p:cxnSp>
-      <p:cxnSp>
-        <p:nvCxnSpPr>
-          <p:cNvPr id="102" name="Straight Connector 101">
-            <a:extLst>
-              <a:ext uri="{FF2B5EF4-FFF2-40B4-BE49-F238E27FC236}">
-                <a16:creationId xmlns:a16="http://schemas.microsoft.com/office/drawing/2014/main" id="{1D8A72B2-2C88-4003-A6E6-88659853725B}"/>
-              </a:ext>
-            </a:extLst>
-          </p:cNvPr>
-          <p:cNvCxnSpPr>
-            <a:cxnSpLocks/>
-          </p:cNvCxnSpPr>
-          <p:nvPr/>
-        </p:nvCxnSpPr>
-        <p:spPr>
-          <a:xfrm>
-            <a:off x="4624599" y="4129229"/>
-            <a:ext cx="1383670" cy="1"/>
-          </a:xfrm>
-          <a:prstGeom prst="line">
-            <a:avLst/>
-          </a:prstGeom>
-          <a:ln w="12700">
-            <a:solidFill>
-              <a:schemeClr val="tx1"/>
-            </a:solidFill>
-          </a:ln>
-        </p:spPr>
-        <p:style>
-          <a:lnRef idx="1">
-            <a:schemeClr val="accent1"/>
-          </a:lnRef>
-          <a:fillRef idx="0">
-            <a:schemeClr val="accent1"/>
-          </a:fillRef>
-          <a:effectRef idx="0">
-            <a:schemeClr val="accent1"/>
-          </a:effectRef>
-          <a:fontRef idx="minor">
-            <a:schemeClr val="tx1"/>
-          </a:fontRef>
-        </p:style>
-      </p:cxnSp>
-      <p:cxnSp>
-        <p:nvCxnSpPr>
-          <p:cNvPr id="104" name="Straight Connector 103">
-            <a:extLst>
-              <a:ext uri="{FF2B5EF4-FFF2-40B4-BE49-F238E27FC236}">
-                <a16:creationId xmlns:a16="http://schemas.microsoft.com/office/drawing/2014/main" id="{0418383B-4C1B-4C59-83FA-684CF7DC1A8F}"/>
-              </a:ext>
-            </a:extLst>
-          </p:cNvPr>
-          <p:cNvCxnSpPr>
-            <a:cxnSpLocks/>
-          </p:cNvCxnSpPr>
-          <p:nvPr/>
-        </p:nvCxnSpPr>
-        <p:spPr>
-          <a:xfrm>
-            <a:off x="7059097" y="3968294"/>
-            <a:ext cx="1383670" cy="1"/>
-          </a:xfrm>
-          <a:prstGeom prst="line">
-            <a:avLst/>
-          </a:prstGeom>
-          <a:ln w="12700">
-            <a:solidFill>
-              <a:schemeClr val="tx1"/>
-            </a:solidFill>
-          </a:ln>
-        </p:spPr>
-        <p:style>
-          <a:lnRef idx="1">
-            <a:schemeClr val="accent1"/>
-          </a:lnRef>
-          <a:fillRef idx="0">
-            <a:schemeClr val="accent1"/>
-          </a:fillRef>
-          <a:effectRef idx="0">
-            <a:schemeClr val="accent1"/>
-          </a:effectRef>
-          <a:fontRef idx="minor">
-            <a:schemeClr val="tx1"/>
-          </a:fontRef>
-        </p:style>
-      </p:cxnSp>
-      <p:cxnSp>
-        <p:nvCxnSpPr>
-          <p:cNvPr id="105" name="Straight Connector 104">
-            <a:extLst>
-              <a:ext uri="{FF2B5EF4-FFF2-40B4-BE49-F238E27FC236}">
-                <a16:creationId xmlns:a16="http://schemas.microsoft.com/office/drawing/2014/main" id="{E60AAE6A-2FED-44A4-B757-AEE05883EED8}"/>
-              </a:ext>
-            </a:extLst>
-          </p:cNvPr>
-          <p:cNvCxnSpPr>
-            <a:cxnSpLocks/>
-          </p:cNvCxnSpPr>
-          <p:nvPr/>
-        </p:nvCxnSpPr>
-        <p:spPr>
-          <a:xfrm>
-            <a:off x="7059097" y="4050763"/>
-            <a:ext cx="1383670" cy="1"/>
-          </a:xfrm>
-          <a:prstGeom prst="line">
-            <a:avLst/>
-          </a:prstGeom>
-          <a:ln w="12700">
-            <a:solidFill>
-              <a:schemeClr val="tx1"/>
-            </a:solidFill>
-          </a:ln>
-        </p:spPr>
-        <p:style>
-          <a:lnRef idx="1">
-            <a:schemeClr val="accent1"/>
-          </a:lnRef>
-          <a:fillRef idx="0">
-            <a:schemeClr val="accent1"/>
-          </a:fillRef>
-          <a:effectRef idx="0">
-            <a:schemeClr val="accent1"/>
-          </a:effectRef>
-          <a:fontRef idx="minor">
-            <a:schemeClr val="tx1"/>
-          </a:fontRef>
-        </p:style>
-      </p:cxnSp>
-      <p:cxnSp>
-        <p:nvCxnSpPr>
-          <p:cNvPr id="107" name="Straight Connector 106">
-            <a:extLst>
-              <a:ext uri="{FF2B5EF4-FFF2-40B4-BE49-F238E27FC236}">
-                <a16:creationId xmlns:a16="http://schemas.microsoft.com/office/drawing/2014/main" id="{54BD61CF-B4B3-4875-ABB0-92AA3F4A42E1}"/>
-              </a:ext>
-            </a:extLst>
-          </p:cNvPr>
-          <p:cNvCxnSpPr>
-            <a:cxnSpLocks/>
-          </p:cNvCxnSpPr>
-          <p:nvPr/>
-        </p:nvCxnSpPr>
-        <p:spPr>
-          <a:xfrm>
-            <a:off x="9481253" y="3971220"/>
-            <a:ext cx="1383670" cy="1"/>
-          </a:xfrm>
-          <a:prstGeom prst="line">
-            <a:avLst/>
-          </a:prstGeom>
-          <a:ln w="12700">
-            <a:solidFill>
-              <a:schemeClr val="tx1"/>
-            </a:solidFill>
-          </a:ln>
-        </p:spPr>
-        <p:style>
-          <a:lnRef idx="1">
-            <a:schemeClr val="accent1"/>
-          </a:lnRef>
-          <a:fillRef idx="0">
-            <a:schemeClr val="accent1"/>
-          </a:fillRef>
-          <a:effectRef idx="0">
-            <a:schemeClr val="accent1"/>
-          </a:effectRef>
-          <a:fontRef idx="minor">
-            <a:schemeClr val="tx1"/>
-          </a:fontRef>
-        </p:style>
-      </p:cxnSp>
     </p:spTree>
     <p:extLst>
       <p:ext uri="{BB962C8B-B14F-4D97-AF65-F5344CB8AC3E}">
@@ -17144,7 +16624,7 @@
         </p:nvSpPr>
         <p:spPr>
           <a:xfrm>
-            <a:off x="2971800" y="2209800"/>
+            <a:off x="3019383" y="2355896"/>
             <a:ext cx="1801368" cy="960120"/>
           </a:xfrm>
           <a:prstGeom prst="rect">
@@ -17193,7 +16673,7 @@
         </p:nvSpPr>
         <p:spPr>
           <a:xfrm>
-            <a:off x="5212466" y="2474976"/>
+            <a:off x="5251946" y="2368079"/>
             <a:ext cx="429768" cy="429768"/>
           </a:xfrm>
           <a:prstGeom prst="ellipse">
@@ -17239,7 +16719,7 @@
         </p:nvSpPr>
         <p:spPr>
           <a:xfrm>
-            <a:off x="3581400" y="4076700"/>
+            <a:off x="3581400" y="4016109"/>
             <a:ext cx="429768" cy="429768"/>
           </a:xfrm>
           <a:prstGeom prst="rect">
@@ -17285,7 +16765,7 @@
         </p:nvSpPr>
         <p:spPr>
           <a:xfrm>
-            <a:off x="4743450" y="4093368"/>
+            <a:off x="4743450" y="4032777"/>
             <a:ext cx="429768" cy="429768"/>
           </a:xfrm>
           <a:prstGeom prst="rect">
@@ -17331,7 +16811,7 @@
         </p:nvSpPr>
         <p:spPr>
           <a:xfrm>
-            <a:off x="5953125" y="4076700"/>
+            <a:off x="5953125" y="4016109"/>
             <a:ext cx="429768" cy="429768"/>
           </a:xfrm>
           <a:prstGeom prst="rect">
@@ -17377,7 +16857,7 @@
         </p:nvSpPr>
         <p:spPr>
           <a:xfrm>
-            <a:off x="7162800" y="4077935"/>
+            <a:off x="7162800" y="4017344"/>
             <a:ext cx="429768" cy="429768"/>
           </a:xfrm>
           <a:prstGeom prst="rect">
@@ -17423,7 +16903,7 @@
         </p:nvSpPr>
         <p:spPr>
           <a:xfrm>
-            <a:off x="4975944" y="2136267"/>
+            <a:off x="5015424" y="2068124"/>
             <a:ext cx="902811" cy="369332"/>
           </a:xfrm>
           <a:prstGeom prst="rect">
@@ -17458,147 +16938,7 @@
         </p:nvSpPr>
         <p:spPr>
           <a:xfrm>
-            <a:off x="3370526" y="4455123"/>
-            <a:ext cx="851515" cy="369332"/>
-          </a:xfrm>
-          <a:prstGeom prst="rect">
-            <a:avLst/>
-          </a:prstGeom>
-          <a:noFill/>
-        </p:spPr>
-        <p:txBody>
-          <a:bodyPr wrap="none" rtlCol="0">
-            <a:spAutoFit/>
-          </a:bodyPr>
-          <a:lstStyle/>
-          <a:p>
-            <a:r>
-              <a:rPr lang="en-US" dirty="0"/>
-              <a:t>Button</a:t>
-            </a:r>
-          </a:p>
-        </p:txBody>
-      </p:sp>
-      <p:sp>
-        <p:nvSpPr>
-          <p:cNvPr id="28" name="TextBox 27">
-            <a:extLst>
-              <a:ext uri="{FF2B5EF4-FFF2-40B4-BE49-F238E27FC236}">
-                <a16:creationId xmlns:a16="http://schemas.microsoft.com/office/drawing/2014/main" id="{B1930CC0-E0EB-4322-A20F-6C95B3767D8B}"/>
-              </a:ext>
-            </a:extLst>
-          </p:cNvPr>
-          <p:cNvSpPr txBox="1"/>
-          <p:nvPr/>
-        </p:nvSpPr>
-        <p:spPr>
-          <a:xfrm>
-            <a:off x="4532577" y="4455123"/>
-            <a:ext cx="851515" cy="369332"/>
-          </a:xfrm>
-          <a:prstGeom prst="rect">
-            <a:avLst/>
-          </a:prstGeom>
-          <a:noFill/>
-        </p:spPr>
-        <p:txBody>
-          <a:bodyPr wrap="none" rtlCol="0">
-            <a:spAutoFit/>
-          </a:bodyPr>
-          <a:lstStyle/>
-          <a:p>
-            <a:r>
-              <a:rPr lang="en-US" dirty="0"/>
-              <a:t>Button</a:t>
-            </a:r>
-          </a:p>
-        </p:txBody>
-      </p:sp>
-      <p:sp>
-        <p:nvSpPr>
-          <p:cNvPr id="29" name="TextBox 28">
-            <a:extLst>
-              <a:ext uri="{FF2B5EF4-FFF2-40B4-BE49-F238E27FC236}">
-                <a16:creationId xmlns:a16="http://schemas.microsoft.com/office/drawing/2014/main" id="{00F124B8-4356-484E-9D8F-E095458D8600}"/>
-              </a:ext>
-            </a:extLst>
-          </p:cNvPr>
-          <p:cNvSpPr txBox="1"/>
-          <p:nvPr/>
-        </p:nvSpPr>
-        <p:spPr>
-          <a:xfrm>
-            <a:off x="5738241" y="4455123"/>
-            <a:ext cx="851515" cy="369332"/>
-          </a:xfrm>
-          <a:prstGeom prst="rect">
-            <a:avLst/>
-          </a:prstGeom>
-          <a:noFill/>
-        </p:spPr>
-        <p:txBody>
-          <a:bodyPr wrap="none" rtlCol="0">
-            <a:spAutoFit/>
-          </a:bodyPr>
-          <a:lstStyle/>
-          <a:p>
-            <a:r>
-              <a:rPr lang="en-US" dirty="0"/>
-              <a:t>Button</a:t>
-            </a:r>
-          </a:p>
-        </p:txBody>
-      </p:sp>
-      <p:sp>
-        <p:nvSpPr>
-          <p:cNvPr id="30" name="TextBox 29">
-            <a:extLst>
-              <a:ext uri="{FF2B5EF4-FFF2-40B4-BE49-F238E27FC236}">
-                <a16:creationId xmlns:a16="http://schemas.microsoft.com/office/drawing/2014/main" id="{7320A3A0-1691-49F0-817D-29603C1B43E3}"/>
-              </a:ext>
-            </a:extLst>
-          </p:cNvPr>
-          <p:cNvSpPr txBox="1"/>
-          <p:nvPr/>
-        </p:nvSpPr>
-        <p:spPr>
-          <a:xfrm>
-            <a:off x="6951926" y="4459448"/>
-            <a:ext cx="851515" cy="369332"/>
-          </a:xfrm>
-          <a:prstGeom prst="rect">
-            <a:avLst/>
-          </a:prstGeom>
-          <a:noFill/>
-        </p:spPr>
-        <p:txBody>
-          <a:bodyPr wrap="none" rtlCol="0">
-            <a:spAutoFit/>
-          </a:bodyPr>
-          <a:lstStyle/>
-          <a:p>
-            <a:r>
-              <a:rPr lang="en-US" dirty="0"/>
-              <a:t>Button</a:t>
-            </a:r>
-          </a:p>
-        </p:txBody>
-      </p:sp>
-      <p:sp>
-        <p:nvSpPr>
-          <p:cNvPr id="31" name="TextBox 30">
-            <a:extLst>
-              <a:ext uri="{FF2B5EF4-FFF2-40B4-BE49-F238E27FC236}">
-                <a16:creationId xmlns:a16="http://schemas.microsoft.com/office/drawing/2014/main" id="{0A432719-2B4D-4BBF-8836-DFAD8DE9BBD9}"/>
-              </a:ext>
-            </a:extLst>
-          </p:cNvPr>
-          <p:cNvSpPr txBox="1"/>
-          <p:nvPr/>
-        </p:nvSpPr>
-        <p:spPr>
-          <a:xfrm>
-            <a:off x="3477624" y="3729228"/>
+            <a:off x="3479530" y="4398857"/>
             <a:ext cx="633507" cy="369332"/>
           </a:xfrm>
           <a:prstGeom prst="rect">
@@ -17614,112 +16954,7 @@
           <a:p>
             <a:r>
               <a:rPr lang="en-US" dirty="0"/>
-              <a:t>LED</a:t>
-            </a:r>
-          </a:p>
-        </p:txBody>
-      </p:sp>
-      <p:sp>
-        <p:nvSpPr>
-          <p:cNvPr id="32" name="TextBox 31">
-            <a:extLst>
-              <a:ext uri="{FF2B5EF4-FFF2-40B4-BE49-F238E27FC236}">
-                <a16:creationId xmlns:a16="http://schemas.microsoft.com/office/drawing/2014/main" id="{B6FDEEF5-A25F-44D6-82D8-9A6D94CCF6D3}"/>
-              </a:ext>
-            </a:extLst>
-          </p:cNvPr>
-          <p:cNvSpPr txBox="1"/>
-          <p:nvPr/>
-        </p:nvSpPr>
-        <p:spPr>
-          <a:xfrm>
-            <a:off x="4646484" y="3731250"/>
-            <a:ext cx="633507" cy="369332"/>
-          </a:xfrm>
-          <a:prstGeom prst="rect">
-            <a:avLst/>
-          </a:prstGeom>
-          <a:noFill/>
-        </p:spPr>
-        <p:txBody>
-          <a:bodyPr wrap="none" rtlCol="0">
-            <a:spAutoFit/>
-          </a:bodyPr>
-          <a:lstStyle/>
-          <a:p>
-            <a:r>
-              <a:rPr lang="en-US" dirty="0"/>
-              <a:t>LED</a:t>
-            </a:r>
-          </a:p>
-        </p:txBody>
-      </p:sp>
-      <p:sp>
-        <p:nvSpPr>
-          <p:cNvPr id="33" name="TextBox 32">
-            <a:extLst>
-              <a:ext uri="{FF2B5EF4-FFF2-40B4-BE49-F238E27FC236}">
-                <a16:creationId xmlns:a16="http://schemas.microsoft.com/office/drawing/2014/main" id="{33E7E5EF-57C7-436D-833E-0FFE24AF7347}"/>
-              </a:ext>
-            </a:extLst>
-          </p:cNvPr>
-          <p:cNvSpPr txBox="1"/>
-          <p:nvPr/>
-        </p:nvSpPr>
-        <p:spPr>
-          <a:xfrm>
-            <a:off x="5851497" y="3724036"/>
-            <a:ext cx="633507" cy="369332"/>
-          </a:xfrm>
-          <a:prstGeom prst="rect">
-            <a:avLst/>
-          </a:prstGeom>
-          <a:noFill/>
-        </p:spPr>
-        <p:txBody>
-          <a:bodyPr wrap="none" rtlCol="0">
-            <a:spAutoFit/>
-          </a:bodyPr>
-          <a:lstStyle/>
-          <a:p>
-            <a:r>
-              <a:rPr lang="en-US" dirty="0"/>
-              <a:t>LED</a:t>
-            </a:r>
-          </a:p>
-        </p:txBody>
-      </p:sp>
-      <p:sp>
-        <p:nvSpPr>
-          <p:cNvPr id="34" name="TextBox 33">
-            <a:extLst>
-              <a:ext uri="{FF2B5EF4-FFF2-40B4-BE49-F238E27FC236}">
-                <a16:creationId xmlns:a16="http://schemas.microsoft.com/office/drawing/2014/main" id="{E659F3D5-3CAD-4A64-9340-A0E4F4544DF6}"/>
-              </a:ext>
-            </a:extLst>
-          </p:cNvPr>
-          <p:cNvSpPr txBox="1"/>
-          <p:nvPr/>
-        </p:nvSpPr>
-        <p:spPr>
-          <a:xfrm>
-            <a:off x="7060929" y="3724036"/>
-            <a:ext cx="633507" cy="369332"/>
-          </a:xfrm>
-          <a:prstGeom prst="rect">
-            <a:avLst/>
-          </a:prstGeom>
-          <a:noFill/>
-        </p:spPr>
-        <p:txBody>
-          <a:bodyPr wrap="none" rtlCol="0">
-            <a:spAutoFit/>
-          </a:bodyPr>
-          <a:lstStyle/>
-          <a:p>
-            <a:r>
-              <a:rPr lang="en-US" dirty="0"/>
-              <a:t>LED</a:t>
+              <a:t>LUB</a:t>
             </a:r>
           </a:p>
         </p:txBody>
@@ -17790,6 +17025,111 @@
             <a:r>
               <a:rPr lang="en-US" dirty="0"/>
               <a:t>6”</a:t>
+            </a:r>
+          </a:p>
+        </p:txBody>
+      </p:sp>
+      <p:sp>
+        <p:nvSpPr>
+          <p:cNvPr id="22" name="TextBox 21">
+            <a:extLst>
+              <a:ext uri="{FF2B5EF4-FFF2-40B4-BE49-F238E27FC236}">
+                <a16:creationId xmlns:a16="http://schemas.microsoft.com/office/drawing/2014/main" id="{F5BADEF2-B3FC-4B79-BE57-93D361F91406}"/>
+              </a:ext>
+            </a:extLst>
+          </p:cNvPr>
+          <p:cNvSpPr txBox="1"/>
+          <p:nvPr/>
+        </p:nvSpPr>
+        <p:spPr>
+          <a:xfrm>
+            <a:off x="4641580" y="4398857"/>
+            <a:ext cx="633507" cy="369332"/>
+          </a:xfrm>
+          <a:prstGeom prst="rect">
+            <a:avLst/>
+          </a:prstGeom>
+          <a:noFill/>
+        </p:spPr>
+        <p:txBody>
+          <a:bodyPr wrap="none" rtlCol="0">
+            <a:spAutoFit/>
+          </a:bodyPr>
+          <a:lstStyle/>
+          <a:p>
+            <a:r>
+              <a:rPr lang="en-US" dirty="0"/>
+              <a:t>LUB</a:t>
+            </a:r>
+          </a:p>
+        </p:txBody>
+      </p:sp>
+      <p:sp>
+        <p:nvSpPr>
+          <p:cNvPr id="23" name="TextBox 22">
+            <a:extLst>
+              <a:ext uri="{FF2B5EF4-FFF2-40B4-BE49-F238E27FC236}">
+                <a16:creationId xmlns:a16="http://schemas.microsoft.com/office/drawing/2014/main" id="{AE71337D-9CFD-4F78-98FF-02A4E9110F45}"/>
+              </a:ext>
+            </a:extLst>
+          </p:cNvPr>
+          <p:cNvSpPr txBox="1"/>
+          <p:nvPr/>
+        </p:nvSpPr>
+        <p:spPr>
+          <a:xfrm>
+            <a:off x="5849963" y="4398857"/>
+            <a:ext cx="633507" cy="369332"/>
+          </a:xfrm>
+          <a:prstGeom prst="rect">
+            <a:avLst/>
+          </a:prstGeom>
+          <a:noFill/>
+        </p:spPr>
+        <p:txBody>
+          <a:bodyPr wrap="none" rtlCol="0">
+            <a:spAutoFit/>
+          </a:bodyPr>
+          <a:lstStyle/>
+          <a:p>
+            <a:r>
+              <a:rPr lang="en-US" dirty="0"/>
+              <a:t>LUB</a:t>
+            </a:r>
+          </a:p>
+        </p:txBody>
+      </p:sp>
+      <p:sp>
+        <p:nvSpPr>
+          <p:cNvPr id="24" name="TextBox 23">
+            <a:extLst>
+              <a:ext uri="{FF2B5EF4-FFF2-40B4-BE49-F238E27FC236}">
+                <a16:creationId xmlns:a16="http://schemas.microsoft.com/office/drawing/2014/main" id="{40B3C74A-2EB0-4F8E-9AE1-D718C654CB39}"/>
+              </a:ext>
+            </a:extLst>
+          </p:cNvPr>
+          <p:cNvSpPr txBox="1"/>
+          <p:nvPr/>
+        </p:nvSpPr>
+        <p:spPr>
+          <a:xfrm>
+            <a:off x="7062438" y="4398857"/>
+            <a:ext cx="633507" cy="369332"/>
+          </a:xfrm>
+          <a:prstGeom prst="rect">
+            <a:avLst/>
+          </a:prstGeom>
+          <a:noFill/>
+        </p:spPr>
+        <p:txBody>
+          <a:bodyPr wrap="none" rtlCol="0">
+            <a:spAutoFit/>
+          </a:bodyPr>
+          <a:lstStyle/>
+          <a:p>
+            <a:r>
+              <a:rPr lang="en-US" dirty="0"/>
+              <a:t>LUB</a:t>
             </a:r>
           </a:p>
         </p:txBody>

</xml_diff>